<commit_message>
fixed typo in final slides
</commit_message>
<xml_diff>
--- a/Project_Info/FinalPresentation/final_slides.pptx
+++ b/Project_Info/FinalPresentation/final_slides.pptx
@@ -2013,11 +2013,7 @@
           </a:pPr>
           <a:r>
             <a:rPr lang="en-US" dirty="0" smtClean="0"/>
-            <a:t>Data </a:t>
-          </a:r>
-          <a:r>
-            <a:rPr lang="en-US" dirty="0" smtClean="0"/>
-            <a:t>cleaning</a:t>
+            <a:t>Data cleaning</a:t>
           </a:r>
           <a:endParaRPr lang="en-US" dirty="0"/>
         </a:p>
@@ -2452,11 +2448,7 @@
           </a:r>
           <a:r>
             <a:rPr lang="en-US" baseline="0" dirty="0" smtClean="0"/>
-            <a:t> </a:t>
-          </a:r>
-          <a:r>
-            <a:rPr lang="en-US" baseline="0" dirty="0" smtClean="0"/>
-            <a:t>cleaning</a:t>
+            <a:t> cleaning</a:t>
           </a:r>
           <a:endParaRPr lang="en-US" dirty="0"/>
         </a:p>
@@ -2704,19 +2696,19 @@
     </dgm:pt>
   </dgm:ptLst>
   <dgm:cxnLst>
+    <dgm:cxn modelId="{4EC1AD80-8B37-6649-9A17-F9ECD079A117}" srcId="{CE0E5302-4D8A-0743-B9CA-77AEB11549A1}" destId="{E9C1924A-4E39-3449-B112-7BA6EBF0284A}" srcOrd="0" destOrd="0" parTransId="{740DA19D-82A0-874F-A740-D34703FF615A}" sibTransId="{B5F009BA-21AC-5D46-AEBE-FD12103C7CFC}"/>
+    <dgm:cxn modelId="{22819992-8D93-4D46-B110-F95F3EC80DC7}" type="presOf" srcId="{E9C1924A-4E39-3449-B112-7BA6EBF0284A}" destId="{5331A7BB-41D3-A34C-8387-A5CBE5AFF493}" srcOrd="0" destOrd="0" presId="urn:microsoft.com/office/officeart/2005/8/layout/StepDownProcess"/>
+    <dgm:cxn modelId="{4542393E-920E-844D-8EC6-6D7ED6B9BCEF}" srcId="{CE0E5302-4D8A-0743-B9CA-77AEB11549A1}" destId="{08E8E1DE-3E7C-8D4A-960F-9885E6E4BD7E}" srcOrd="1" destOrd="0" parTransId="{A2962900-D64E-5E46-8619-F00E218E7D60}" sibTransId="{A0CE1544-684A-064B-83B0-C779E9F93FF3}"/>
+    <dgm:cxn modelId="{AD2DBA92-EBF5-D648-9DB8-CABA00C8262F}" srcId="{5E78C9B2-9236-9747-A86F-EC00933AA6CB}" destId="{EC2CCA1B-332E-1A48-861D-AACD82002C2A}" srcOrd="0" destOrd="0" parTransId="{32C50338-9B30-6B46-A28F-E859E9AF8740}" sibTransId="{54C7DB49-0424-6D40-A021-BD2199D4C94A}"/>
+    <dgm:cxn modelId="{F825D407-4AB1-A74F-AC26-FF1C9B0979CF}" srcId="{CE0E5302-4D8A-0743-B9CA-77AEB11549A1}" destId="{5E78C9B2-9236-9747-A86F-EC00933AA6CB}" srcOrd="2" destOrd="0" parTransId="{5F02C329-230A-954F-AB5D-3C488E5FEE2F}" sibTransId="{D39DA73E-C447-E844-80E2-4D02DFC97731}"/>
+    <dgm:cxn modelId="{0B66AD7F-C80F-5B47-8137-40188AAD3BFE}" srcId="{08E8E1DE-3E7C-8D4A-960F-9885E6E4BD7E}" destId="{265E65C9-DAF5-B042-8E9F-8C77AB112C24}" srcOrd="0" destOrd="0" parTransId="{97FAF380-DE20-E24C-946E-EF235F8D06A6}" sibTransId="{258E4D36-6AFC-D94B-8929-8555F860FD8D}"/>
+    <dgm:cxn modelId="{A866A2A5-BADE-D24E-A1EA-08F7EE9BB1BC}" type="presOf" srcId="{BA4F1286-787E-724C-8DC7-9FBA53FC508F}" destId="{20DCDA5B-5154-0D42-A095-CEEB0A27AD78}" srcOrd="0" destOrd="0" presId="urn:microsoft.com/office/officeart/2005/8/layout/StepDownProcess"/>
+    <dgm:cxn modelId="{AC85AF9E-82B3-6F41-B742-09B30DBB2BD9}" type="presOf" srcId="{08E8E1DE-3E7C-8D4A-960F-9885E6E4BD7E}" destId="{66AC3943-5D4A-AA46-B734-4C1AE8B8A15D}" srcOrd="0" destOrd="0" presId="urn:microsoft.com/office/officeart/2005/8/layout/StepDownProcess"/>
+    <dgm:cxn modelId="{C49C145B-8C04-9948-9638-1B2D124555BA}" type="presOf" srcId="{265E65C9-DAF5-B042-8E9F-8C77AB112C24}" destId="{3BB081E3-37C6-B347-8FC0-81CC7A31FF65}" srcOrd="0" destOrd="0" presId="urn:microsoft.com/office/officeart/2005/8/layout/StepDownProcess"/>
     <dgm:cxn modelId="{3B480C7C-B81F-1D48-8BEF-891698CA1B92}" srcId="{E9C1924A-4E39-3449-B112-7BA6EBF0284A}" destId="{BA4F1286-787E-724C-8DC7-9FBA53FC508F}" srcOrd="0" destOrd="0" parTransId="{3BC57F34-12FA-3147-92B5-0CE9BAFEB245}" sibTransId="{EA9A9E75-86C7-B148-BC45-8AA735BAE1B7}"/>
-    <dgm:cxn modelId="{4542393E-920E-844D-8EC6-6D7ED6B9BCEF}" srcId="{CE0E5302-4D8A-0743-B9CA-77AEB11549A1}" destId="{08E8E1DE-3E7C-8D4A-960F-9885E6E4BD7E}" srcOrd="1" destOrd="0" parTransId="{A2962900-D64E-5E46-8619-F00E218E7D60}" sibTransId="{A0CE1544-684A-064B-83B0-C779E9F93FF3}"/>
     <dgm:cxn modelId="{73D2BED0-DA41-2D48-87C3-7DDD2B071FED}" type="presOf" srcId="{EC2CCA1B-332E-1A48-861D-AACD82002C2A}" destId="{BC523890-BAD8-3144-989E-93141368D3DC}" srcOrd="0" destOrd="0" presId="urn:microsoft.com/office/officeart/2005/8/layout/StepDownProcess"/>
-    <dgm:cxn modelId="{C49C145B-8C04-9948-9638-1B2D124555BA}" type="presOf" srcId="{265E65C9-DAF5-B042-8E9F-8C77AB112C24}" destId="{3BB081E3-37C6-B347-8FC0-81CC7A31FF65}" srcOrd="0" destOrd="0" presId="urn:microsoft.com/office/officeart/2005/8/layout/StepDownProcess"/>
-    <dgm:cxn modelId="{0B66AD7F-C80F-5B47-8137-40188AAD3BFE}" srcId="{08E8E1DE-3E7C-8D4A-960F-9885E6E4BD7E}" destId="{265E65C9-DAF5-B042-8E9F-8C77AB112C24}" srcOrd="0" destOrd="0" parTransId="{97FAF380-DE20-E24C-946E-EF235F8D06A6}" sibTransId="{258E4D36-6AFC-D94B-8929-8555F860FD8D}"/>
-    <dgm:cxn modelId="{4EC1AD80-8B37-6649-9A17-F9ECD079A117}" srcId="{CE0E5302-4D8A-0743-B9CA-77AEB11549A1}" destId="{E9C1924A-4E39-3449-B112-7BA6EBF0284A}" srcOrd="0" destOrd="0" parTransId="{740DA19D-82A0-874F-A740-D34703FF615A}" sibTransId="{B5F009BA-21AC-5D46-AEBE-FD12103C7CFC}"/>
-    <dgm:cxn modelId="{A866A2A5-BADE-D24E-A1EA-08F7EE9BB1BC}" type="presOf" srcId="{BA4F1286-787E-724C-8DC7-9FBA53FC508F}" destId="{20DCDA5B-5154-0D42-A095-CEEB0A27AD78}" srcOrd="0" destOrd="0" presId="urn:microsoft.com/office/officeart/2005/8/layout/StepDownProcess"/>
-    <dgm:cxn modelId="{F825D407-4AB1-A74F-AC26-FF1C9B0979CF}" srcId="{CE0E5302-4D8A-0743-B9CA-77AEB11549A1}" destId="{5E78C9B2-9236-9747-A86F-EC00933AA6CB}" srcOrd="2" destOrd="0" parTransId="{5F02C329-230A-954F-AB5D-3C488E5FEE2F}" sibTransId="{D39DA73E-C447-E844-80E2-4D02DFC97731}"/>
+    <dgm:cxn modelId="{509AC089-B638-644A-B650-98DE530C4C85}" type="presOf" srcId="{5E78C9B2-9236-9747-A86F-EC00933AA6CB}" destId="{16FF6E05-278F-D345-8D42-D9E80EE2C700}" srcOrd="0" destOrd="0" presId="urn:microsoft.com/office/officeart/2005/8/layout/StepDownProcess"/>
     <dgm:cxn modelId="{F92125C7-46C4-574B-831D-2C30C6DD66B3}" type="presOf" srcId="{CE0E5302-4D8A-0743-B9CA-77AEB11549A1}" destId="{877FE32A-2D35-DF4C-BBB4-EB35AF5D0E3D}" srcOrd="0" destOrd="0" presId="urn:microsoft.com/office/officeart/2005/8/layout/StepDownProcess"/>
-    <dgm:cxn modelId="{509AC089-B638-644A-B650-98DE530C4C85}" type="presOf" srcId="{5E78C9B2-9236-9747-A86F-EC00933AA6CB}" destId="{16FF6E05-278F-D345-8D42-D9E80EE2C700}" srcOrd="0" destOrd="0" presId="urn:microsoft.com/office/officeart/2005/8/layout/StepDownProcess"/>
-    <dgm:cxn modelId="{AD2DBA92-EBF5-D648-9DB8-CABA00C8262F}" srcId="{5E78C9B2-9236-9747-A86F-EC00933AA6CB}" destId="{EC2CCA1B-332E-1A48-861D-AACD82002C2A}" srcOrd="0" destOrd="0" parTransId="{32C50338-9B30-6B46-A28F-E859E9AF8740}" sibTransId="{54C7DB49-0424-6D40-A021-BD2199D4C94A}"/>
-    <dgm:cxn modelId="{AC85AF9E-82B3-6F41-B742-09B30DBB2BD9}" type="presOf" srcId="{08E8E1DE-3E7C-8D4A-960F-9885E6E4BD7E}" destId="{66AC3943-5D4A-AA46-B734-4C1AE8B8A15D}" srcOrd="0" destOrd="0" presId="urn:microsoft.com/office/officeart/2005/8/layout/StepDownProcess"/>
-    <dgm:cxn modelId="{22819992-8D93-4D46-B110-F95F3EC80DC7}" type="presOf" srcId="{E9C1924A-4E39-3449-B112-7BA6EBF0284A}" destId="{5331A7BB-41D3-A34C-8387-A5CBE5AFF493}" srcOrd="0" destOrd="0" presId="urn:microsoft.com/office/officeart/2005/8/layout/StepDownProcess"/>
     <dgm:cxn modelId="{9BCEAC17-DA5C-9541-AED9-813AEA1B4C49}" type="presParOf" srcId="{877FE32A-2D35-DF4C-BBB4-EB35AF5D0E3D}" destId="{0A9CD8FF-49F1-0042-AE1E-AEBA2EBFFEF5}" srcOrd="0" destOrd="0" presId="urn:microsoft.com/office/officeart/2005/8/layout/StepDownProcess"/>
     <dgm:cxn modelId="{B4D7949C-B298-674F-91AC-8026623BF2B7}" type="presParOf" srcId="{0A9CD8FF-49F1-0042-AE1E-AEBA2EBFFEF5}" destId="{128831BA-13D3-4446-B7EA-4860EE50F70E}" srcOrd="0" destOrd="0" presId="urn:microsoft.com/office/officeart/2005/8/layout/StepDownProcess"/>
     <dgm:cxn modelId="{F396991D-3476-CC40-A031-D2346C33F17E}" type="presParOf" srcId="{0A9CD8FF-49F1-0042-AE1E-AEBA2EBFFEF5}" destId="{5331A7BB-41D3-A34C-8387-A5CBE5AFF493}" srcOrd="1" destOrd="0" presId="urn:microsoft.com/office/officeart/2005/8/layout/StepDownProcess"/>
@@ -2968,7 +2960,7 @@
             <a:spcAft>
               <a:spcPct val="15000"/>
             </a:spcAft>
-            <a:buChar char="••"/>
+            <a:buChar char="•"/>
           </a:pPr>
           <a:endParaRPr lang="en-US" sz="1300" kern="1200" dirty="0"/>
         </a:p>
@@ -3197,15 +3189,11 @@
             <a:spcAft>
               <a:spcPct val="15000"/>
             </a:spcAft>
-            <a:buChar char="••"/>
+            <a:buChar char="•"/>
           </a:pPr>
           <a:r>
             <a:rPr lang="en-US" sz="1300" kern="1200" dirty="0" smtClean="0"/>
-            <a:t>Data </a:t>
-          </a:r>
-          <a:r>
-            <a:rPr lang="en-US" sz="1300" kern="1200" dirty="0" smtClean="0"/>
-            <a:t>cleaning</a:t>
+            <a:t>Data cleaning</a:t>
           </a:r>
           <a:endParaRPr lang="en-US" sz="1300" kern="1200" dirty="0"/>
         </a:p>
@@ -3384,7 +3372,7 @@
             <a:spcAft>
               <a:spcPct val="15000"/>
             </a:spcAft>
-            <a:buChar char="••"/>
+            <a:buChar char="•"/>
           </a:pPr>
           <a:endParaRPr lang="en-US" sz="1700" kern="1200"/>
         </a:p>
@@ -3626,7 +3614,7 @@
             <a:spcAft>
               <a:spcPct val="15000"/>
             </a:spcAft>
-            <a:buChar char="••"/>
+            <a:buChar char="•"/>
           </a:pPr>
           <a:endParaRPr lang="en-US" sz="1300" kern="1200"/>
         </a:p>
@@ -3860,7 +3848,7 @@
             <a:spcAft>
               <a:spcPct val="15000"/>
             </a:spcAft>
-            <a:buChar char="••"/>
+            <a:buChar char="•"/>
           </a:pPr>
           <a:r>
             <a:rPr lang="en-US" sz="1300" kern="1200" dirty="0" smtClean="0"/>
@@ -3868,11 +3856,7 @@
           </a:r>
           <a:r>
             <a:rPr lang="en-US" sz="1300" kern="1200" baseline="0" dirty="0" smtClean="0"/>
-            <a:t> </a:t>
-          </a:r>
-          <a:r>
-            <a:rPr lang="en-US" sz="1300" kern="1200" baseline="0" dirty="0" smtClean="0"/>
-            <a:t>cleaning</a:t>
+            <a:t> cleaning</a:t>
           </a:r>
           <a:endParaRPr lang="en-US" sz="1300" kern="1200" dirty="0"/>
         </a:p>
@@ -4051,7 +4035,7 @@
             <a:spcAft>
               <a:spcPct val="15000"/>
             </a:spcAft>
-            <a:buChar char="••"/>
+            <a:buChar char="•"/>
           </a:pPr>
           <a:endParaRPr lang="en-US" sz="1700" kern="1200" dirty="0"/>
         </a:p>
@@ -6995,7 +6979,7 @@
           <a:p>
             <a:fld id="{F7AFFB9B-9FB8-469E-96F9-4D32314110B6}" type="datetimeFigureOut">
               <a:rPr lang="en-US" smtClean="0"/>
-              <a:t>3/9/17</a:t>
+              <a:t>3/13/17</a:t>
             </a:fld>
             <a:endParaRPr lang="en-US" dirty="0"/>
           </a:p>
@@ -7204,7 +7188,7 @@
           <a:p>
             <a:fld id="{49FF1211-4E0C-4AB3-B04F-585959BDAFE8}" type="datetimeFigureOut">
               <a:rPr lang="en-US" smtClean="0"/>
-              <a:t>3/9/17</a:t>
+              <a:t>3/13/17</a:t>
             </a:fld>
             <a:endParaRPr lang="en-US" dirty="0"/>
           </a:p>
@@ -7460,7 +7444,7 @@
           <a:p>
             <a:fld id="{28BDECAF-D3BE-4069-9C78-642ECCD01477}" type="datetimeFigureOut">
               <a:rPr lang="en-US" smtClean="0"/>
-              <a:t>3/9/17</a:t>
+              <a:t>3/13/17</a:t>
             </a:fld>
             <a:endParaRPr lang="en-US" dirty="0"/>
           </a:p>
@@ -7634,7 +7618,7 @@
           <a:p>
             <a:fld id="{8EFBDC27-E420-4878-9EE6-7B9656D6442A}" type="datetimeFigureOut">
               <a:rPr lang="en-US" smtClean="0"/>
-              <a:t>3/9/17</a:t>
+              <a:t>3/13/17</a:t>
             </a:fld>
             <a:endParaRPr lang="en-US" dirty="0"/>
           </a:p>
@@ -7977,7 +7961,7 @@
           <a:p>
             <a:fld id="{0F7F47CF-67C9-420C-80A5-E2069FF0C2DF}" type="datetimeFigureOut">
               <a:rPr lang="en-US" smtClean="0"/>
-              <a:t>3/9/17</a:t>
+              <a:t>3/13/17</a:t>
             </a:fld>
             <a:endParaRPr lang="en-US" dirty="0"/>
           </a:p>
@@ -8252,7 +8236,7 @@
           <a:p>
             <a:fld id="{AE22DC73-F065-42F5-A9F2-D90B2E42A0B3}" type="datetimeFigureOut">
               <a:rPr lang="en-US" smtClean="0"/>
-              <a:t>3/9/17</a:t>
+              <a:t>3/13/17</a:t>
             </a:fld>
             <a:endParaRPr lang="en-US" dirty="0"/>
           </a:p>
@@ -8631,7 +8615,7 @@
           <a:p>
             <a:fld id="{76BEA702-9B29-41CC-9BCC-3DF8A0D379FE}" type="datetimeFigureOut">
               <a:rPr lang="en-US" smtClean="0"/>
-              <a:t>3/9/17</a:t>
+              <a:t>3/13/17</a:t>
             </a:fld>
             <a:endParaRPr lang="en-US" dirty="0"/>
           </a:p>
@@ -8749,7 +8733,7 @@
           <a:p>
             <a:fld id="{097649AC-CB8F-4FF1-9A34-5861C74DD0A7}" type="datetimeFigureOut">
               <a:rPr lang="en-US" smtClean="0"/>
-              <a:t>3/9/17</a:t>
+              <a:t>3/13/17</a:t>
             </a:fld>
             <a:endParaRPr lang="en-US" dirty="0"/>
           </a:p>
@@ -8920,7 +8904,7 @@
           <a:p>
             <a:fld id="{3EC5CECA-2D3A-4680-9B49-752200DE467C}" type="datetimeFigureOut">
               <a:rPr lang="en-US" smtClean="0"/>
-              <a:t>3/9/17</a:t>
+              <a:t>3/13/17</a:t>
             </a:fld>
             <a:endParaRPr lang="en-US" dirty="0"/>
           </a:p>
@@ -9274,7 +9258,7 @@
           <a:p>
             <a:fld id="{50C3BFE2-83B7-4B0A-B9D3-AB28331082B3}" type="datetimeFigureOut">
               <a:rPr lang="en-US" smtClean="0"/>
-              <a:t>3/9/17</a:t>
+              <a:t>3/13/17</a:t>
             </a:fld>
             <a:endParaRPr lang="en-US" dirty="0"/>
           </a:p>
@@ -9656,7 +9640,7 @@
           <a:p>
             <a:fld id="{12EF78E3-FDA3-4D28-AAA2-0B81F349A39D}" type="datetimeFigureOut">
               <a:rPr lang="en-US" smtClean="0"/>
-              <a:t>3/9/17</a:t>
+              <a:t>3/13/17</a:t>
             </a:fld>
             <a:endParaRPr lang="en-US" dirty="0"/>
           </a:p>
@@ -9943,7 +9927,7 @@
           <a:p>
             <a:fld id="{C35BB1C6-BF8F-4481-8AB2-603A1C8A906A}" type="datetimeFigureOut">
               <a:rPr lang="en-US" smtClean="0"/>
-              <a:t>3/9/17</a:t>
+              <a:t>3/13/17</a:t>
             </a:fld>
             <a:endParaRPr lang="en-US" dirty="0"/>
           </a:p>
@@ -10742,11 +10726,7 @@
             </a:pPr>
             <a:r>
               <a:rPr lang="en-US" dirty="0" smtClean="0"/>
-              <a:t>The </a:t>
-            </a:r>
-            <a:r>
-              <a:rPr lang="en-US" dirty="0" smtClean="0"/>
-              <a:t>project Goals</a:t>
+              <a:t>The project Goals</a:t>
             </a:r>
           </a:p>
           <a:p>
@@ -10756,11 +10736,7 @@
             </a:pPr>
             <a:r>
               <a:rPr lang="en-US" dirty="0" smtClean="0"/>
-              <a:t>Functionality </a:t>
-            </a:r>
-            <a:r>
-              <a:rPr lang="en-US" dirty="0" smtClean="0"/>
-              <a:t>Goals</a:t>
+              <a:t>Functionality Goals</a:t>
             </a:r>
           </a:p>
           <a:p>
@@ -10770,11 +10746,7 @@
             </a:pPr>
             <a:r>
               <a:rPr lang="en-US" dirty="0" smtClean="0"/>
-              <a:t>System </a:t>
-            </a:r>
-            <a:r>
-              <a:rPr lang="en-US" dirty="0" smtClean="0"/>
-              <a:t>Structure </a:t>
+              <a:t>System Structure </a:t>
             </a:r>
           </a:p>
           <a:p>
@@ -10786,7 +10758,6 @@
               <a:rPr lang="en-US" dirty="0" smtClean="0"/>
               <a:t>Demo</a:t>
             </a:r>
-            <a:endParaRPr lang="en-US" dirty="0" smtClean="0"/>
           </a:p>
         </p:txBody>
       </p:sp>
@@ -10873,15 +10844,7 @@
             </a:pPr>
             <a:r>
               <a:rPr lang="en-US" sz="3200" dirty="0" smtClean="0"/>
-              <a:t> To design a course scheduling program that </a:t>
-            </a:r>
-            <a:r>
-              <a:rPr lang="en-US" sz="3200" dirty="0" smtClean="0"/>
-              <a:t>allows </a:t>
-            </a:r>
-            <a:r>
-              <a:rPr lang="en-US" sz="3200" dirty="0" smtClean="0"/>
-              <a:t>all </a:t>
+              <a:t> To design a course scheduling program that allows all </a:t>
             </a:r>
             <a:r>
               <a:rPr lang="en-US" sz="3200" dirty="0" err="1" smtClean="0"/>
@@ -10889,25 +10852,8 @@
             </a:r>
             <a:r>
               <a:rPr lang="en-US" sz="3200" dirty="0" smtClean="0"/>
-              <a:t> </a:t>
-            </a:r>
-            <a:r>
-              <a:rPr lang="en-US" sz="3200" dirty="0" smtClean="0"/>
-              <a:t>Students to obtain ideal </a:t>
-            </a:r>
-            <a:r>
-              <a:rPr lang="en-US" sz="3200" dirty="0" smtClean="0"/>
-              <a:t>schedules they want and to take classes with the </a:t>
-            </a:r>
-            <a:r>
-              <a:rPr lang="en-US" sz="3200" dirty="0" smtClean="0"/>
-              <a:t>professors </a:t>
-            </a:r>
-            <a:r>
-              <a:rPr lang="en-US" sz="3200" dirty="0" smtClean="0"/>
-              <a:t>they like</a:t>
-            </a:r>
-            <a:endParaRPr lang="en-US" sz="3200" dirty="0" smtClean="0"/>
+              <a:t> Students to obtain ideal schedules they want and to take classes with the professors they like</a:t>
+            </a:r>
           </a:p>
           <a:p>
             <a:pPr marL="715518" lvl="1" indent="-514350">
@@ -10926,19 +10872,7 @@
             </a:pPr>
             <a:r>
               <a:rPr lang="en-US" sz="2600" dirty="0" smtClean="0"/>
-              <a:t>Enable </a:t>
-            </a:r>
-            <a:r>
-              <a:rPr lang="en-US" sz="2600" dirty="0" smtClean="0"/>
-              <a:t>users to visualize </a:t>
-            </a:r>
-            <a:r>
-              <a:rPr lang="en-US" sz="2600" dirty="0" smtClean="0"/>
-              <a:t>and download feasible </a:t>
-            </a:r>
-            <a:r>
-              <a:rPr lang="en-US" sz="2600" dirty="0" smtClean="0"/>
-              <a:t>schedules </a:t>
+              <a:t>Enable users to visualize and download feasible schedules </a:t>
             </a:r>
             <a:endParaRPr lang="en-US" sz="2800" dirty="0"/>
           </a:p>
@@ -10949,15 +10883,7 @@
             </a:pPr>
             <a:r>
               <a:rPr lang="en-US" sz="2800" dirty="0" smtClean="0"/>
-              <a:t>Re-design </a:t>
-            </a:r>
-            <a:r>
-              <a:rPr lang="en-US" sz="2800" dirty="0" smtClean="0"/>
-              <a:t>and integrate course evaluation </a:t>
-            </a:r>
-            <a:r>
-              <a:rPr lang="en-US" sz="2800" dirty="0" smtClean="0"/>
-              <a:t>pages</a:t>
+              <a:t>Re-design and integrate course evaluation pages</a:t>
             </a:r>
           </a:p>
           <a:p>
@@ -10967,31 +10893,7 @@
             </a:pPr>
             <a:r>
               <a:rPr lang="en-US" sz="2800" dirty="0" smtClean="0"/>
-              <a:t>Sending </a:t>
-            </a:r>
-            <a:r>
-              <a:rPr lang="en-US" sz="2800" dirty="0" smtClean="0"/>
-              <a:t>an email </a:t>
-            </a:r>
-            <a:r>
-              <a:rPr lang="en-US" sz="2800" dirty="0" smtClean="0"/>
-              <a:t>notifying </a:t>
-            </a:r>
-            <a:r>
-              <a:rPr lang="en-US" sz="2800" dirty="0" smtClean="0"/>
-              <a:t>empty </a:t>
-            </a:r>
-            <a:r>
-              <a:rPr lang="en-US" sz="2800" dirty="0" smtClean="0"/>
-              <a:t>seat </a:t>
-            </a:r>
-            <a:r>
-              <a:rPr lang="en-US" sz="2800" dirty="0" smtClean="0"/>
-              <a:t>from </a:t>
-            </a:r>
-            <a:r>
-              <a:rPr lang="en-US" sz="2800" dirty="0" smtClean="0"/>
-              <a:t>desired classes</a:t>
+              <a:t>Sending an email notifying empty seat from desired classes</a:t>
             </a:r>
           </a:p>
           <a:p>
@@ -11003,7 +10905,6 @@
               <a:rPr lang="en-US" sz="2800" dirty="0" smtClean="0"/>
               <a:t>Integrate all above features </a:t>
             </a:r>
-            <a:endParaRPr lang="en-US" sz="2800" dirty="0" smtClean="0"/>
           </a:p>
         </p:txBody>
       </p:sp>
@@ -11065,11 +10966,7 @@
             </a:r>
             <a:r>
               <a:rPr lang="en-US" dirty="0" smtClean="0"/>
-              <a:t> </a:t>
-            </a:r>
-            <a:r>
-              <a:rPr lang="en-US" dirty="0" smtClean="0"/>
-              <a:t>Goals</a:t>
+              <a:t> Goals</a:t>
             </a:r>
             <a:endParaRPr lang="en-US" dirty="0"/>
           </a:p>
@@ -11108,13 +11005,8 @@
             </a:pPr>
             <a:r>
               <a:rPr lang="en-US" sz="3200" dirty="0" smtClean="0"/>
-              <a:t>V</a:t>
-            </a:r>
-            <a:r>
-              <a:rPr lang="en-US" sz="3200" dirty="0" smtClean="0"/>
-              <a:t>isualization of feasible course schedules</a:t>
-            </a:r>
-            <a:endParaRPr lang="en-US" sz="3200" dirty="0" smtClean="0"/>
+              <a:t>Visualization of feasible course schedules</a:t>
+            </a:r>
           </a:p>
           <a:p>
             <a:pPr>
@@ -11153,13 +11045,8 @@
             </a:pPr>
             <a:r>
               <a:rPr lang="en-US" sz="3200" dirty="0" smtClean="0"/>
-              <a:t>Empty Spot </a:t>
-            </a:r>
-            <a:r>
-              <a:rPr lang="en-US" sz="3200" dirty="0" smtClean="0"/>
-              <a:t>Reminder</a:t>
-            </a:r>
-            <a:endParaRPr lang="en-US" sz="3200" dirty="0" smtClean="0"/>
+              <a:t>Empty Spot Reminder</a:t>
+            </a:r>
           </a:p>
           <a:p>
             <a:pPr marL="0" indent="0">
@@ -11410,11 +11297,7 @@
           <a:p>
             <a:r>
               <a:rPr lang="en-US" dirty="0"/>
-              <a:t>System </a:t>
-            </a:r>
-            <a:r>
-              <a:rPr lang="en-US" dirty="0"/>
-              <a:t>structure - Course </a:t>
+              <a:t>System structure - Course </a:t>
             </a:r>
             <a:r>
               <a:rPr lang="en-US" dirty="0" smtClean="0"/>
@@ -11459,16 +11342,13 @@
             </a:pPr>
             <a:r>
               <a:rPr lang="en-US" dirty="0" smtClean="0"/>
-              <a:t>Selenium, </a:t>
-            </a:r>
-            <a:r>
-              <a:rPr lang="en-US" dirty="0" err="1" smtClean="0"/>
-              <a:t>PhantomJs</a:t>
-            </a:r>
-            <a:r>
-              <a:rPr lang="en-US" dirty="0" smtClean="0"/>
-              <a:t>  </a:t>
-            </a:r>
+              <a:t>Selenium</a:t>
+            </a:r>
+            <a:r>
+              <a:rPr lang="en-US" smtClean="0"/>
+              <a:t>, PhantomJS  </a:t>
+            </a:r>
+            <a:endParaRPr lang="en-US" dirty="0" smtClean="0"/>
           </a:p>
           <a:p>
             <a:pPr>
@@ -11509,7 +11389,6 @@
               <a:rPr lang="en-US" dirty="0" smtClean="0"/>
               <a:t>toring to SQL database</a:t>
             </a:r>
-            <a:endParaRPr lang="en-US" dirty="0" smtClean="0"/>
           </a:p>
           <a:p>
             <a:pPr>
@@ -11522,15 +11401,7 @@
             </a:r>
             <a:r>
               <a:rPr lang="en-US" sz="2400" u="sng" dirty="0" smtClean="0"/>
-              <a:t>Challenges </a:t>
-            </a:r>
-            <a:r>
-              <a:rPr lang="en-US" sz="2400" u="sng" dirty="0" smtClean="0"/>
-              <a:t>and </a:t>
-            </a:r>
-            <a:r>
-              <a:rPr lang="en-US" sz="2400" u="sng" dirty="0" smtClean="0"/>
-              <a:t>overcome</a:t>
+              <a:t>Challenges and overcome</a:t>
             </a:r>
           </a:p>
           <a:p>
@@ -11550,11 +11421,7 @@
             </a:pPr>
             <a:r>
               <a:rPr lang="en-US" dirty="0" smtClean="0"/>
-              <a:t>Session Expired (Web Element Stale</a:t>
-            </a:r>
-            <a:r>
-              <a:rPr lang="en-US" dirty="0" smtClean="0"/>
-              <a:t>ness/</a:t>
+              <a:t>Session Expired (Web Element Staleness/</a:t>
             </a:r>
             <a:r>
               <a:rPr lang="en-US" dirty="0" err="1" smtClean="0"/>
@@ -11574,7 +11441,6 @@
               <a:rPr lang="en-US" dirty="0" smtClean="0"/>
               <a:t>Implicit/Explicit Waiting Time</a:t>
             </a:r>
-            <a:endParaRPr lang="en-US" dirty="0" smtClean="0"/>
           </a:p>
           <a:p>
             <a:pPr lvl="1">
@@ -11608,11 +11474,7 @@
             </a:pPr>
             <a:r>
               <a:rPr lang="en-US" dirty="0" smtClean="0"/>
-              <a:t>Schedule V</a:t>
-            </a:r>
-            <a:r>
-              <a:rPr lang="en-US" dirty="0" smtClean="0"/>
-              <a:t>isualization </a:t>
+              <a:t>Schedule Visualization </a:t>
             </a:r>
             <a:endParaRPr lang="en-US" dirty="0"/>
           </a:p>
@@ -11672,11 +11534,7 @@
           <a:p>
             <a:r>
               <a:rPr lang="en-US" dirty="0"/>
-              <a:t>System </a:t>
-            </a:r>
-            <a:r>
-              <a:rPr lang="en-US" dirty="0"/>
-              <a:t>structure - </a:t>
+              <a:t>System structure - </a:t>
             </a:r>
             <a:r>
               <a:rPr lang="en-US" dirty="0" smtClean="0"/>
@@ -12023,11 +11881,7 @@
           <a:p>
             <a:r>
               <a:rPr lang="en-US" dirty="0"/>
-              <a:t>System </a:t>
-            </a:r>
-            <a:r>
-              <a:rPr lang="en-US" dirty="0"/>
-              <a:t>structure - </a:t>
+              <a:t>System structure - </a:t>
             </a:r>
             <a:r>
               <a:rPr lang="en-US" dirty="0" err="1"/>

</xml_diff>